<commit_message>
Created Video and PP
</commit_message>
<xml_diff>
--- a/presentation/Chat_Happens.pptx
+++ b/presentation/Chat_Happens.pptx
@@ -3776,7 +3776,11 @@
           <a:lstStyle/>
           <a:p>
             <a:r>
-              <a:rPr lang="en-GB" dirty="0"/>
+              <a:rPr lang="en-GB" dirty="0">
+                <a:solidFill>
+                  <a:srgbClr val="00E7FF"/>
+                </a:solidFill>
+              </a:rPr>
               <a:t>Chat Happens</a:t>
             </a:r>
           </a:p>
@@ -3804,25 +3808,49 @@
           <a:lstStyle/>
           <a:p>
             <a:r>
-              <a:rPr lang="en-GB" dirty="0"/>
+              <a:rPr lang="en-GB" dirty="0">
+                <a:solidFill>
+                  <a:srgbClr val="FB4673"/>
+                </a:solidFill>
+              </a:rPr>
               <a:t>Tobias </a:t>
             </a:r>
             <a:r>
-              <a:rPr lang="en-GB" dirty="0" err="1"/>
+              <a:rPr lang="en-GB" dirty="0" err="1">
+                <a:solidFill>
+                  <a:srgbClr val="FB4673"/>
+                </a:solidFill>
+              </a:rPr>
               <a:t>Stoderegger</a:t>
             </a:r>
-            <a:endParaRPr lang="en-GB" dirty="0"/>
-          </a:p>
-          <a:p>
-            <a:r>
-              <a:rPr lang="en-GB" dirty="0"/>
+            <a:endParaRPr lang="en-GB" dirty="0">
+              <a:solidFill>
+                <a:srgbClr val="FB4673"/>
+              </a:solidFill>
+            </a:endParaRPr>
+          </a:p>
+          <a:p>
+            <a:r>
+              <a:rPr lang="en-GB" dirty="0">
+                <a:solidFill>
+                  <a:srgbClr val="FB4673"/>
+                </a:solidFill>
+              </a:rPr>
               <a:t>Paul </a:t>
             </a:r>
             <a:r>
-              <a:rPr lang="en-GB" dirty="0" err="1"/>
+              <a:rPr lang="en-GB" dirty="0" err="1">
+                <a:solidFill>
+                  <a:srgbClr val="FB4673"/>
+                </a:solidFill>
+              </a:rPr>
               <a:t>Panosch</a:t>
             </a:r>
-            <a:endParaRPr lang="en-GB" dirty="0"/>
+            <a:endParaRPr lang="en-GB" dirty="0">
+              <a:solidFill>
+                <a:srgbClr val="FB4673"/>
+              </a:solidFill>
+            </a:endParaRPr>
           </a:p>
         </p:txBody>
       </p:sp>
@@ -3878,10 +3906,18 @@
           <a:lstStyle/>
           <a:p>
             <a:r>
-              <a:rPr lang="de-DE" dirty="0"/>
+              <a:rPr lang="de-DE" dirty="0">
+                <a:solidFill>
+                  <a:srgbClr val="FB4673"/>
+                </a:solidFill>
+              </a:rPr>
               <a:t>Fazit</a:t>
             </a:r>
-            <a:endParaRPr lang="en-GB" dirty="0"/>
+            <a:endParaRPr lang="en-GB" dirty="0">
+              <a:solidFill>
+                <a:srgbClr val="FB4673"/>
+              </a:solidFill>
+            </a:endParaRPr>
           </a:p>
         </p:txBody>
       </p:sp>
@@ -4155,7 +4191,11 @@
           <a:lstStyle/>
           <a:p>
             <a:r>
-              <a:rPr lang="en-GB" dirty="0"/>
+              <a:rPr lang="en-GB" dirty="0">
+                <a:solidFill>
+                  <a:srgbClr val="FB4673"/>
+                </a:solidFill>
+              </a:rPr>
               <a:t>Agenda</a:t>
             </a:r>
           </a:p>
@@ -4187,7 +4227,11 @@
               <a:buAutoNum type="arabicPeriod"/>
             </a:pPr>
             <a:r>
-              <a:rPr lang="de-DE" dirty="0"/>
+              <a:rPr lang="de-DE" dirty="0">
+                <a:solidFill>
+                  <a:schemeClr val="bg1"/>
+                </a:solidFill>
+              </a:rPr>
               <a:t>Wer sind wir</a:t>
             </a:r>
           </a:p>
@@ -4197,7 +4241,11 @@
               <a:buAutoNum type="arabicPeriod"/>
             </a:pPr>
             <a:r>
-              <a:rPr lang="de-DE" dirty="0"/>
+              <a:rPr lang="de-DE" dirty="0">
+                <a:solidFill>
+                  <a:schemeClr val="bg1"/>
+                </a:solidFill>
+              </a:rPr>
               <a:t>Projekt</a:t>
             </a:r>
           </a:p>
@@ -4207,7 +4255,11 @@
               <a:buAutoNum type="arabicPeriod"/>
             </a:pPr>
             <a:r>
-              <a:rPr lang="de-DE" dirty="0"/>
+              <a:rPr lang="de-DE" dirty="0">
+                <a:solidFill>
+                  <a:schemeClr val="bg1"/>
+                </a:solidFill>
+              </a:rPr>
               <a:t>Technologien</a:t>
             </a:r>
           </a:p>
@@ -4217,7 +4269,11 @@
               <a:buAutoNum type="arabicPeriod"/>
             </a:pPr>
             <a:r>
-              <a:rPr lang="de-DE" dirty="0"/>
+              <a:rPr lang="de-DE" dirty="0">
+                <a:solidFill>
+                  <a:schemeClr val="bg1"/>
+                </a:solidFill>
+              </a:rPr>
               <a:t>Ablauf</a:t>
             </a:r>
           </a:p>
@@ -4227,7 +4283,11 @@
               <a:buAutoNum type="arabicPeriod"/>
             </a:pPr>
             <a:r>
-              <a:rPr lang="de-DE" dirty="0"/>
+              <a:rPr lang="de-DE" dirty="0">
+                <a:solidFill>
+                  <a:schemeClr val="bg1"/>
+                </a:solidFill>
+              </a:rPr>
               <a:t>Schwierigkeiten</a:t>
             </a:r>
           </a:p>
@@ -4237,7 +4297,11 @@
               <a:buAutoNum type="arabicPeriod"/>
             </a:pPr>
             <a:r>
-              <a:rPr lang="de-DE" dirty="0"/>
+              <a:rPr lang="de-DE" dirty="0">
+                <a:solidFill>
+                  <a:schemeClr val="bg1"/>
+                </a:solidFill>
+              </a:rPr>
               <a:t>Gelerntes</a:t>
             </a:r>
           </a:p>
@@ -4247,10 +4311,18 @@
               <a:buAutoNum type="arabicPeriod"/>
             </a:pPr>
             <a:r>
-              <a:rPr lang="de-DE" dirty="0"/>
+              <a:rPr lang="de-DE" dirty="0">
+                <a:solidFill>
+                  <a:schemeClr val="bg1"/>
+                </a:solidFill>
+              </a:rPr>
               <a:t>Fazit</a:t>
             </a:r>
-            <a:endParaRPr lang="en-GB" dirty="0"/>
+            <a:endParaRPr lang="en-GB" dirty="0">
+              <a:solidFill>
+                <a:schemeClr val="bg1"/>
+              </a:solidFill>
+            </a:endParaRPr>
           </a:p>
         </p:txBody>
       </p:sp>
@@ -4365,10 +4437,18 @@
           <a:lstStyle/>
           <a:p>
             <a:r>
-              <a:rPr lang="de-DE" dirty="0"/>
+              <a:rPr lang="de-DE" dirty="0">
+                <a:solidFill>
+                  <a:srgbClr val="FB4673"/>
+                </a:solidFill>
+              </a:rPr>
               <a:t>Wer sind wir</a:t>
             </a:r>
-            <a:endParaRPr lang="en-GB" dirty="0"/>
+            <a:endParaRPr lang="en-GB" dirty="0">
+              <a:solidFill>
+                <a:srgbClr val="FB4673"/>
+              </a:solidFill>
+            </a:endParaRPr>
           </a:p>
         </p:txBody>
       </p:sp>
@@ -4570,10 +4650,18 @@
           <a:lstStyle/>
           <a:p>
             <a:r>
-              <a:rPr lang="de-DE" dirty="0"/>
+              <a:rPr lang="de-DE" dirty="0">
+                <a:solidFill>
+                  <a:srgbClr val="FB4673"/>
+                </a:solidFill>
+              </a:rPr>
               <a:t>Projekt</a:t>
             </a:r>
-            <a:endParaRPr lang="en-GB" dirty="0"/>
+            <a:endParaRPr lang="en-GB" dirty="0">
+              <a:solidFill>
+                <a:srgbClr val="FB4673"/>
+              </a:solidFill>
+            </a:endParaRPr>
           </a:p>
         </p:txBody>
       </p:sp>
@@ -4778,10 +4866,18 @@
           <a:lstStyle/>
           <a:p>
             <a:r>
-              <a:rPr lang="de-DE" dirty="0"/>
+              <a:rPr lang="de-DE" dirty="0">
+                <a:solidFill>
+                  <a:srgbClr val="FB4673"/>
+                </a:solidFill>
+              </a:rPr>
               <a:t>Technologien</a:t>
             </a:r>
-            <a:endParaRPr lang="en-GB" dirty="0"/>
+            <a:endParaRPr lang="en-GB" dirty="0">
+              <a:solidFill>
+                <a:srgbClr val="FB4673"/>
+              </a:solidFill>
+            </a:endParaRPr>
           </a:p>
         </p:txBody>
       </p:sp>
@@ -4986,10 +5082,18 @@
           <a:lstStyle/>
           <a:p>
             <a:r>
-              <a:rPr lang="de-DE" dirty="0"/>
+              <a:rPr lang="de-DE" dirty="0">
+                <a:solidFill>
+                  <a:srgbClr val="FB4673"/>
+                </a:solidFill>
+              </a:rPr>
               <a:t>Ablauf</a:t>
             </a:r>
-            <a:endParaRPr lang="en-GB" dirty="0"/>
+            <a:endParaRPr lang="en-GB" dirty="0">
+              <a:solidFill>
+                <a:srgbClr val="FB4673"/>
+              </a:solidFill>
+            </a:endParaRPr>
           </a:p>
         </p:txBody>
       </p:sp>
@@ -5295,10 +5399,18 @@
           <a:lstStyle/>
           <a:p>
             <a:r>
-              <a:rPr lang="de-DE" dirty="0"/>
+              <a:rPr lang="de-DE" dirty="0">
+                <a:solidFill>
+                  <a:srgbClr val="FB4673"/>
+                </a:solidFill>
+              </a:rPr>
               <a:t>Schlecht gelaufen</a:t>
             </a:r>
-            <a:endParaRPr lang="en-GB" dirty="0"/>
+            <a:endParaRPr lang="en-GB" dirty="0">
+              <a:solidFill>
+                <a:srgbClr val="FB4673"/>
+              </a:solidFill>
+            </a:endParaRPr>
           </a:p>
         </p:txBody>
       </p:sp>
@@ -5553,7 +5665,11 @@
           <a:lstStyle/>
           <a:p>
             <a:r>
-              <a:rPr lang="de-DE" dirty="0"/>
+              <a:rPr lang="de-DE" dirty="0">
+                <a:solidFill>
+                  <a:srgbClr val="FB4673"/>
+                </a:solidFill>
+              </a:rPr>
               <a:t>Gut gelaufen</a:t>
             </a:r>
           </a:p>
@@ -5724,7 +5840,11 @@
           <a:lstStyle/>
           <a:p>
             <a:r>
-              <a:rPr lang="de-DE" dirty="0"/>
+              <a:rPr lang="de-DE" dirty="0">
+                <a:solidFill>
+                  <a:srgbClr val="FB4673"/>
+                </a:solidFill>
+              </a:rPr>
               <a:t>Aktueller Stand</a:t>
             </a:r>
           </a:p>

</xml_diff>